<commit_message>
fixed type B imm encoding & decoding
</commit_message>
<xml_diff>
--- a/doc/fhe_ram.pptx
+++ b/doc/fhe_ram.pptx
@@ -243,7 +243,7 @@
           <a:p>
             <a:fld id="{78452DCF-1AF1-4B8F-8E33-9B64B9D08B20}" type="datetimeFigureOut">
               <a:rPr lang="en-US" smtClean="0"/>
-              <a:t>1/13/2025</a:t>
+              <a:t>3/3/2025</a:t>
             </a:fld>
             <a:endParaRPr lang="en-US"/>
           </a:p>
@@ -413,7 +413,7 @@
           <a:p>
             <a:fld id="{78452DCF-1AF1-4B8F-8E33-9B64B9D08B20}" type="datetimeFigureOut">
               <a:rPr lang="en-US" smtClean="0"/>
-              <a:t>1/13/2025</a:t>
+              <a:t>3/3/2025</a:t>
             </a:fld>
             <a:endParaRPr lang="en-US"/>
           </a:p>
@@ -593,7 +593,7 @@
           <a:p>
             <a:fld id="{78452DCF-1AF1-4B8F-8E33-9B64B9D08B20}" type="datetimeFigureOut">
               <a:rPr lang="en-US" smtClean="0"/>
-              <a:t>1/13/2025</a:t>
+              <a:t>3/3/2025</a:t>
             </a:fld>
             <a:endParaRPr lang="en-US"/>
           </a:p>
@@ -763,7 +763,7 @@
           <a:p>
             <a:fld id="{78452DCF-1AF1-4B8F-8E33-9B64B9D08B20}" type="datetimeFigureOut">
               <a:rPr lang="en-US" smtClean="0"/>
-              <a:t>1/13/2025</a:t>
+              <a:t>3/3/2025</a:t>
             </a:fld>
             <a:endParaRPr lang="en-US"/>
           </a:p>
@@ -1009,7 +1009,7 @@
           <a:p>
             <a:fld id="{78452DCF-1AF1-4B8F-8E33-9B64B9D08B20}" type="datetimeFigureOut">
               <a:rPr lang="en-US" smtClean="0"/>
-              <a:t>1/13/2025</a:t>
+              <a:t>3/3/2025</a:t>
             </a:fld>
             <a:endParaRPr lang="en-US"/>
           </a:p>
@@ -1241,7 +1241,7 @@
           <a:p>
             <a:fld id="{78452DCF-1AF1-4B8F-8E33-9B64B9D08B20}" type="datetimeFigureOut">
               <a:rPr lang="en-US" smtClean="0"/>
-              <a:t>1/13/2025</a:t>
+              <a:t>3/3/2025</a:t>
             </a:fld>
             <a:endParaRPr lang="en-US"/>
           </a:p>
@@ -1608,7 +1608,7 @@
           <a:p>
             <a:fld id="{78452DCF-1AF1-4B8F-8E33-9B64B9D08B20}" type="datetimeFigureOut">
               <a:rPr lang="en-US" smtClean="0"/>
-              <a:t>1/13/2025</a:t>
+              <a:t>3/3/2025</a:t>
             </a:fld>
             <a:endParaRPr lang="en-US"/>
           </a:p>
@@ -1726,7 +1726,7 @@
           <a:p>
             <a:fld id="{78452DCF-1AF1-4B8F-8E33-9B64B9D08B20}" type="datetimeFigureOut">
               <a:rPr lang="en-US" smtClean="0"/>
-              <a:t>1/13/2025</a:t>
+              <a:t>3/3/2025</a:t>
             </a:fld>
             <a:endParaRPr lang="en-US"/>
           </a:p>
@@ -1821,7 +1821,7 @@
           <a:p>
             <a:fld id="{78452DCF-1AF1-4B8F-8E33-9B64B9D08B20}" type="datetimeFigureOut">
               <a:rPr lang="en-US" smtClean="0"/>
-              <a:t>1/13/2025</a:t>
+              <a:t>3/3/2025</a:t>
             </a:fld>
             <a:endParaRPr lang="en-US"/>
           </a:p>
@@ -2098,7 +2098,7 @@
           <a:p>
             <a:fld id="{78452DCF-1AF1-4B8F-8E33-9B64B9D08B20}" type="datetimeFigureOut">
               <a:rPr lang="en-US" smtClean="0"/>
-              <a:t>1/13/2025</a:t>
+              <a:t>3/3/2025</a:t>
             </a:fld>
             <a:endParaRPr lang="en-US"/>
           </a:p>
@@ -2355,7 +2355,7 @@
           <a:p>
             <a:fld id="{78452DCF-1AF1-4B8F-8E33-9B64B9D08B20}" type="datetimeFigureOut">
               <a:rPr lang="en-US" smtClean="0"/>
-              <a:t>1/13/2025</a:t>
+              <a:t>3/3/2025</a:t>
             </a:fld>
             <a:endParaRPr lang="en-US"/>
           </a:p>
@@ -2568,7 +2568,7 @@
           <a:p>
             <a:fld id="{78452DCF-1AF1-4B8F-8E33-9B64B9D08B20}" type="datetimeFigureOut">
               <a:rPr lang="en-US" smtClean="0"/>
-              <a:t>1/13/2025</a:t>
+              <a:t>3/3/2025</a:t>
             </a:fld>
             <a:endParaRPr lang="en-US"/>
           </a:p>
@@ -5335,8 +5335,8 @@
           </p:txBody>
         </p:sp>
       </p:grpSp>
-      <mc:AlternateContent xmlns:mc="http://schemas.openxmlformats.org/markup-compatibility/2006">
-        <mc:Choice xmlns:a14="http://schemas.microsoft.com/office/drawing/2010/main" Requires="a14">
+      <mc:AlternateContent xmlns:mc="http://schemas.openxmlformats.org/markup-compatibility/2006" xmlns:a14="http://schemas.microsoft.com/office/drawing/2010/main">
+        <mc:Choice Requires="a14">
           <p:sp>
             <p:nvSpPr>
               <p:cNvPr id="582" name="TextBox 581">
@@ -5406,7 +5406,7 @@
             </p:txBody>
           </p:sp>
         </mc:Choice>
-        <mc:Fallback>
+        <mc:Fallback xmlns="">
           <p:sp>
             <p:nvSpPr>
               <p:cNvPr id="582" name="TextBox 581">
@@ -5659,8 +5659,8 @@
           </p:txBody>
         </p:sp>
       </p:grpSp>
-      <mc:AlternateContent xmlns:mc="http://schemas.openxmlformats.org/markup-compatibility/2006">
-        <mc:Choice xmlns:a14="http://schemas.microsoft.com/office/drawing/2010/main" Requires="a14">
+      <mc:AlternateContent xmlns:mc="http://schemas.openxmlformats.org/markup-compatibility/2006" xmlns:a14="http://schemas.microsoft.com/office/drawing/2010/main">
+        <mc:Choice Requires="a14">
           <p:sp>
             <p:nvSpPr>
               <p:cNvPr id="588" name="TextBox 587">
@@ -5750,7 +5750,7 @@
             </p:txBody>
           </p:sp>
         </mc:Choice>
-        <mc:Fallback>
+        <mc:Fallback xmlns="">
           <p:sp>
             <p:nvSpPr>
               <p:cNvPr id="588" name="TextBox 587">
@@ -6003,8 +6003,8 @@
           </p:txBody>
         </p:sp>
       </p:grpSp>
-      <mc:AlternateContent xmlns:mc="http://schemas.openxmlformats.org/markup-compatibility/2006">
-        <mc:Choice xmlns:a14="http://schemas.microsoft.com/office/drawing/2010/main" Requires="a14">
+      <mc:AlternateContent xmlns:mc="http://schemas.openxmlformats.org/markup-compatibility/2006" xmlns:a14="http://schemas.microsoft.com/office/drawing/2010/main">
+        <mc:Choice Requires="a14">
           <p:sp>
             <p:nvSpPr>
               <p:cNvPr id="594" name="TextBox 593">
@@ -6094,7 +6094,7 @@
             </p:txBody>
           </p:sp>
         </mc:Choice>
-        <mc:Fallback>
+        <mc:Fallback xmlns="">
           <p:sp>
             <p:nvSpPr>
               <p:cNvPr id="594" name="TextBox 593">
@@ -6347,8 +6347,8 @@
           </p:txBody>
         </p:sp>
       </p:grpSp>
-      <mc:AlternateContent xmlns:mc="http://schemas.openxmlformats.org/markup-compatibility/2006">
-        <mc:Choice xmlns:a14="http://schemas.microsoft.com/office/drawing/2010/main" Requires="a14">
+      <mc:AlternateContent xmlns:mc="http://schemas.openxmlformats.org/markup-compatibility/2006" xmlns:a14="http://schemas.microsoft.com/office/drawing/2010/main">
+        <mc:Choice Requires="a14">
           <p:sp>
             <p:nvSpPr>
               <p:cNvPr id="600" name="TextBox 599">
@@ -6438,7 +6438,7 @@
             </p:txBody>
           </p:sp>
         </mc:Choice>
-        <mc:Fallback>
+        <mc:Fallback xmlns="">
           <p:sp>
             <p:nvSpPr>
               <p:cNvPr id="600" name="TextBox 599">
@@ -6691,8 +6691,8 @@
           </p:txBody>
         </p:sp>
       </p:grpSp>
-      <mc:AlternateContent xmlns:mc="http://schemas.openxmlformats.org/markup-compatibility/2006">
-        <mc:Choice xmlns:a14="http://schemas.microsoft.com/office/drawing/2010/main" Requires="a14">
+      <mc:AlternateContent xmlns:mc="http://schemas.openxmlformats.org/markup-compatibility/2006" xmlns:a14="http://schemas.microsoft.com/office/drawing/2010/main">
+        <mc:Choice Requires="a14">
           <p:sp>
             <p:nvSpPr>
               <p:cNvPr id="606" name="TextBox 605">
@@ -6782,7 +6782,7 @@
             </p:txBody>
           </p:sp>
         </mc:Choice>
-        <mc:Fallback>
+        <mc:Fallback xmlns="">
           <p:sp>
             <p:nvSpPr>
               <p:cNvPr id="606" name="TextBox 605">
@@ -9591,10 +9591,10 @@
       </p:cxnSp>
       <p:sp>
         <p:nvSpPr>
-          <p:cNvPr id="655" name="Rectangle 654">
-            <a:extLst>
-              <a:ext uri="{FF2B5EF4-FFF2-40B4-BE49-F238E27FC236}">
-                <a16:creationId xmlns:a16="http://schemas.microsoft.com/office/drawing/2014/main" id="{F95D3786-5F2C-BC29-29A9-C0698CB52038}"/>
+          <p:cNvPr id="657" name="Rectangle 656">
+            <a:extLst>
+              <a:ext uri="{FF2B5EF4-FFF2-40B4-BE49-F238E27FC236}">
+                <a16:creationId xmlns:a16="http://schemas.microsoft.com/office/drawing/2014/main" id="{026CD230-C673-14FE-3ABB-1A1A4A9318B6}"/>
               </a:ext>
             </a:extLst>
           </p:cNvPr>
@@ -9603,7 +9603,7 @@
         </p:nvSpPr>
         <p:spPr>
           <a:xfrm>
-            <a:off x="2755931" y="9507606"/>
+            <a:off x="1473804" y="10866291"/>
             <a:ext cx="354076" cy="354076"/>
           </a:xfrm>
           <a:prstGeom prst="rect">
@@ -9642,242 +9642,6 @@
           </a:p>
         </p:txBody>
       </p:sp>
-      <p:sp>
-        <p:nvSpPr>
-          <p:cNvPr id="656" name="Rectangle: Rounded Corners 655">
-            <a:extLst>
-              <a:ext uri="{FF2B5EF4-FFF2-40B4-BE49-F238E27FC236}">
-                <a16:creationId xmlns:a16="http://schemas.microsoft.com/office/drawing/2014/main" id="{6D25E64E-9E6F-037F-E8DF-D61420A884B4}"/>
-              </a:ext>
-            </a:extLst>
-          </p:cNvPr>
-          <p:cNvSpPr/>
-          <p:nvPr/>
-        </p:nvSpPr>
-        <p:spPr>
-          <a:xfrm>
-            <a:off x="2839144" y="10437782"/>
-            <a:ext cx="901889" cy="266700"/>
-          </a:xfrm>
-          <a:prstGeom prst="roundRect">
-            <a:avLst/>
-          </a:prstGeom>
-          <a:solidFill>
-            <a:schemeClr val="bg2">
-              <a:lumMod val="75000"/>
-            </a:schemeClr>
-          </a:solidFill>
-        </p:spPr>
-        <p:style>
-          <a:lnRef idx="2">
-            <a:schemeClr val="dk1">
-              <a:shade val="15000"/>
-            </a:schemeClr>
-          </a:lnRef>
-          <a:fillRef idx="1">
-            <a:schemeClr val="dk1"/>
-          </a:fillRef>
-          <a:effectRef idx="0">
-            <a:schemeClr val="dk1"/>
-          </a:effectRef>
-          <a:fontRef idx="minor">
-            <a:schemeClr val="lt1"/>
-          </a:fontRef>
-        </p:style>
-        <p:txBody>
-          <a:bodyPr rtlCol="0" anchor="ctr"/>
-          <a:lstStyle/>
-          <a:p>
-            <a:pPr algn="ctr"/>
-            <a:r>
-              <a:rPr lang="fr-CH" dirty="0"/>
-              <a:t>CMUX</a:t>
-            </a:r>
-            <a:endParaRPr lang="en-US" dirty="0"/>
-          </a:p>
-        </p:txBody>
-      </p:sp>
-      <p:sp>
-        <p:nvSpPr>
-          <p:cNvPr id="657" name="Rectangle 656">
-            <a:extLst>
-              <a:ext uri="{FF2B5EF4-FFF2-40B4-BE49-F238E27FC236}">
-                <a16:creationId xmlns:a16="http://schemas.microsoft.com/office/drawing/2014/main" id="{026CD230-C673-14FE-3ABB-1A1A4A9318B6}"/>
-              </a:ext>
-            </a:extLst>
-          </p:cNvPr>
-          <p:cNvSpPr/>
-          <p:nvPr/>
-        </p:nvSpPr>
-        <p:spPr>
-          <a:xfrm>
-            <a:off x="3112104" y="11285391"/>
-            <a:ext cx="354076" cy="354076"/>
-          </a:xfrm>
-          <a:prstGeom prst="rect">
-            <a:avLst/>
-          </a:prstGeom>
-          <a:solidFill>
-            <a:srgbClr val="FF0000"/>
-          </a:solidFill>
-        </p:spPr>
-        <p:style>
-          <a:lnRef idx="2">
-            <a:schemeClr val="accent1">
-              <a:shade val="15000"/>
-            </a:schemeClr>
-          </a:lnRef>
-          <a:fillRef idx="1">
-            <a:schemeClr val="accent1"/>
-          </a:fillRef>
-          <a:effectRef idx="0">
-            <a:schemeClr val="accent1"/>
-          </a:effectRef>
-          <a:fontRef idx="minor">
-            <a:schemeClr val="lt1"/>
-          </a:fontRef>
-        </p:style>
-        <p:txBody>
-          <a:bodyPr lIns="0" tIns="0" rIns="0" bIns="0" rtlCol="0" anchor="ctr"/>
-          <a:lstStyle/>
-          <a:p>
-            <a:pPr algn="ctr"/>
-            <a:endParaRPr lang="en-US" dirty="0">
-              <a:solidFill>
-                <a:schemeClr val="tx1"/>
-              </a:solidFill>
-            </a:endParaRPr>
-          </a:p>
-        </p:txBody>
-      </p:sp>
-      <p:cxnSp>
-        <p:nvCxnSpPr>
-          <p:cNvPr id="658" name="Straight Arrow Connector 657">
-            <a:extLst>
-              <a:ext uri="{FF2B5EF4-FFF2-40B4-BE49-F238E27FC236}">
-                <a16:creationId xmlns:a16="http://schemas.microsoft.com/office/drawing/2014/main" id="{6E2A9E22-FCE8-EDA5-F184-5EDBDBEF0071}"/>
-              </a:ext>
-            </a:extLst>
-          </p:cNvPr>
-          <p:cNvCxnSpPr>
-            <a:cxnSpLocks/>
-            <a:stCxn id="656" idx="2"/>
-            <a:endCxn id="657" idx="0"/>
-          </p:cNvCxnSpPr>
-          <p:nvPr/>
-        </p:nvCxnSpPr>
-        <p:spPr>
-          <a:xfrm flipH="1">
-            <a:off x="3289147" y="10704481"/>
-            <a:ext cx="943" cy="580910"/>
-          </a:xfrm>
-          <a:prstGeom prst="straightConnector1">
-            <a:avLst/>
-          </a:prstGeom>
-          <a:ln>
-            <a:tailEnd type="triangle"/>
-          </a:ln>
-        </p:spPr>
-        <p:style>
-          <a:lnRef idx="2">
-            <a:schemeClr val="dk1"/>
-          </a:lnRef>
-          <a:fillRef idx="0">
-            <a:schemeClr val="dk1"/>
-          </a:fillRef>
-          <a:effectRef idx="1">
-            <a:schemeClr val="dk1"/>
-          </a:effectRef>
-          <a:fontRef idx="minor">
-            <a:schemeClr val="tx1"/>
-          </a:fontRef>
-        </p:style>
-      </p:cxnSp>
-      <p:cxnSp>
-        <p:nvCxnSpPr>
-          <p:cNvPr id="659" name="Straight Arrow Connector 658">
-            <a:extLst>
-              <a:ext uri="{FF2B5EF4-FFF2-40B4-BE49-F238E27FC236}">
-                <a16:creationId xmlns:a16="http://schemas.microsoft.com/office/drawing/2014/main" id="{A17CB947-9C21-0F97-FF20-59D66683A8C5}"/>
-              </a:ext>
-            </a:extLst>
-          </p:cNvPr>
-          <p:cNvCxnSpPr>
-            <a:cxnSpLocks/>
-            <a:stCxn id="655" idx="2"/>
-          </p:cNvCxnSpPr>
-          <p:nvPr/>
-        </p:nvCxnSpPr>
-        <p:spPr>
-          <a:xfrm>
-            <a:off x="2932969" y="9861685"/>
-            <a:ext cx="0" cy="560263"/>
-          </a:xfrm>
-          <a:prstGeom prst="straightConnector1">
-            <a:avLst/>
-          </a:prstGeom>
-          <a:ln>
-            <a:tailEnd type="triangle"/>
-          </a:ln>
-        </p:spPr>
-        <p:style>
-          <a:lnRef idx="2">
-            <a:schemeClr val="dk1"/>
-          </a:lnRef>
-          <a:fillRef idx="0">
-            <a:schemeClr val="dk1"/>
-          </a:fillRef>
-          <a:effectRef idx="1">
-            <a:schemeClr val="dk1"/>
-          </a:effectRef>
-          <a:fontRef idx="minor">
-            <a:schemeClr val="tx1"/>
-          </a:fontRef>
-        </p:style>
-      </p:cxnSp>
-      <p:cxnSp>
-        <p:nvCxnSpPr>
-          <p:cNvPr id="660" name="Straight Arrow Connector 59">
-            <a:extLst>
-              <a:ext uri="{FF2B5EF4-FFF2-40B4-BE49-F238E27FC236}">
-                <a16:creationId xmlns:a16="http://schemas.microsoft.com/office/drawing/2014/main" id="{FA161CFE-0BFA-8659-2DE4-CE15198052BB}"/>
-              </a:ext>
-            </a:extLst>
-          </p:cNvPr>
-          <p:cNvCxnSpPr>
-            <a:cxnSpLocks/>
-            <a:stCxn id="615" idx="1"/>
-            <a:endCxn id="656" idx="0"/>
-          </p:cNvCxnSpPr>
-          <p:nvPr/>
-        </p:nvCxnSpPr>
-        <p:spPr>
-          <a:xfrm rot="10800000" flipV="1">
-            <a:off x="3290086" y="10012338"/>
-            <a:ext cx="1217002" cy="425444"/>
-          </a:xfrm>
-          <a:prstGeom prst="bentConnector2">
-            <a:avLst/>
-          </a:prstGeom>
-          <a:ln>
-            <a:tailEnd type="triangle"/>
-          </a:ln>
-        </p:spPr>
-        <p:style>
-          <a:lnRef idx="2">
-            <a:schemeClr val="dk1"/>
-          </a:lnRef>
-          <a:fillRef idx="0">
-            <a:schemeClr val="dk1"/>
-          </a:fillRef>
-          <a:effectRef idx="1">
-            <a:schemeClr val="dk1"/>
-          </a:effectRef>
-          <a:fontRef idx="minor">
-            <a:schemeClr val="tx1"/>
-          </a:fontRef>
-        </p:style>
-      </p:cxnSp>
       <p:grpSp>
         <p:nvGrpSpPr>
           <p:cNvPr id="661" name="Group 660">
@@ -10139,8 +9903,8 @@
         </p:nvCxnSpPr>
         <p:spPr>
           <a:xfrm rot="16200000" flipH="1">
-            <a:off x="3685396" y="11243218"/>
-            <a:ext cx="511049" cy="1303546"/>
+            <a:off x="2656690" y="10214518"/>
+            <a:ext cx="930150" cy="2941847"/>
           </a:xfrm>
           <a:prstGeom prst="bentConnector2">
             <a:avLst/>
@@ -11976,8 +11740,8 @@
           </p:txBody>
         </p:sp>
       </p:grpSp>
-      <mc:AlternateContent xmlns:mc="http://schemas.openxmlformats.org/markup-compatibility/2006">
-        <mc:Choice xmlns:a14="http://schemas.microsoft.com/office/drawing/2010/main" Requires="a14">
+      <mc:AlternateContent xmlns:mc="http://schemas.openxmlformats.org/markup-compatibility/2006" xmlns:a14="http://schemas.microsoft.com/office/drawing/2010/main">
+        <mc:Choice Requires="a14">
           <p:sp>
             <p:nvSpPr>
               <p:cNvPr id="702" name="TextBox 701">
@@ -12067,7 +11831,7 @@
             </p:txBody>
           </p:sp>
         </mc:Choice>
-        <mc:Fallback>
+        <mc:Fallback xmlns="">
           <p:sp>
             <p:nvSpPr>
               <p:cNvPr id="702" name="TextBox 701">
@@ -17344,8 +17108,8 @@
           </p:txBody>
         </p:sp>
       </p:grpSp>
-      <mc:AlternateContent xmlns:mc="http://schemas.openxmlformats.org/markup-compatibility/2006">
-        <mc:Choice xmlns:a14="http://schemas.microsoft.com/office/drawing/2010/main" Requires="a14">
+      <mc:AlternateContent xmlns:mc="http://schemas.openxmlformats.org/markup-compatibility/2006" xmlns:a14="http://schemas.microsoft.com/office/drawing/2010/main">
+        <mc:Choice Requires="a14">
           <p:sp>
             <p:nvSpPr>
               <p:cNvPr id="819" name="TextBox 818">
@@ -17414,7 +17178,7 @@
             </p:txBody>
           </p:sp>
         </mc:Choice>
-        <mc:Fallback>
+        <mc:Fallback xmlns="">
           <p:sp>
             <p:nvSpPr>
               <p:cNvPr id="819" name="TextBox 818">
@@ -17625,8 +17389,8 @@
           </p:txBody>
         </p:sp>
       </p:grpSp>
-      <mc:AlternateContent xmlns:mc="http://schemas.openxmlformats.org/markup-compatibility/2006">
-        <mc:Choice xmlns:a14="http://schemas.microsoft.com/office/drawing/2010/main" Requires="a14">
+      <mc:AlternateContent xmlns:mc="http://schemas.openxmlformats.org/markup-compatibility/2006" xmlns:a14="http://schemas.microsoft.com/office/drawing/2010/main">
+        <mc:Choice Requires="a14">
           <p:sp>
             <p:nvSpPr>
               <p:cNvPr id="824" name="TextBox 823">
@@ -17683,13 +17447,7 @@
                             <a:rPr lang="fr-CH" i="1">
                               <a:latin typeface="Cambria Math" panose="02040503050406030204" pitchFamily="18" charset="0"/>
                             </a:rPr>
-                            <m:t>−</m:t>
-                          </m:r>
-                          <m:r>
-                            <a:rPr lang="fr-CH" i="1">
-                              <a:latin typeface="Cambria Math" panose="02040503050406030204" pitchFamily="18" charset="0"/>
-                            </a:rPr>
-                            <m:t>2</m:t>
+                            <m:t>−2</m:t>
                           </m:r>
                         </m:sup>
                       </m:sSup>
@@ -17701,7 +17459,7 @@
             </p:txBody>
           </p:sp>
         </mc:Choice>
-        <mc:Fallback>
+        <mc:Fallback xmlns="">
           <p:sp>
             <p:nvSpPr>
               <p:cNvPr id="824" name="TextBox 823">
@@ -17912,8 +17670,8 @@
           </p:txBody>
         </p:sp>
       </p:grpSp>
-      <mc:AlternateContent xmlns:mc="http://schemas.openxmlformats.org/markup-compatibility/2006">
-        <mc:Choice xmlns:a14="http://schemas.microsoft.com/office/drawing/2010/main" Requires="a14">
+      <mc:AlternateContent xmlns:mc="http://schemas.openxmlformats.org/markup-compatibility/2006" xmlns:a14="http://schemas.microsoft.com/office/drawing/2010/main">
+        <mc:Choice Requires="a14">
           <p:sp>
             <p:nvSpPr>
               <p:cNvPr id="829" name="TextBox 828">
@@ -17970,13 +17728,7 @@
                             <a:rPr lang="fr-CH" i="1">
                               <a:latin typeface="Cambria Math" panose="02040503050406030204" pitchFamily="18" charset="0"/>
                             </a:rPr>
-                            <m:t>−</m:t>
-                          </m:r>
-                          <m:r>
-                            <a:rPr lang="fr-CH" i="1">
-                              <a:latin typeface="Cambria Math" panose="02040503050406030204" pitchFamily="18" charset="0"/>
-                            </a:rPr>
-                            <m:t>3</m:t>
+                            <m:t>−3</m:t>
                           </m:r>
                         </m:sup>
                       </m:sSup>
@@ -17988,7 +17740,7 @@
             </p:txBody>
           </p:sp>
         </mc:Choice>
-        <mc:Fallback>
+        <mc:Fallback xmlns="">
           <p:sp>
             <p:nvSpPr>
               <p:cNvPr id="829" name="TextBox 828">
@@ -18451,8 +18203,8 @@
           </p:txBody>
         </p:sp>
       </p:grpSp>
-      <mc:AlternateContent xmlns:mc="http://schemas.openxmlformats.org/markup-compatibility/2006">
-        <mc:Choice xmlns:a14="http://schemas.microsoft.com/office/drawing/2010/main" Requires="a14">
+      <mc:AlternateContent xmlns:mc="http://schemas.openxmlformats.org/markup-compatibility/2006" xmlns:a14="http://schemas.microsoft.com/office/drawing/2010/main">
+        <mc:Choice Requires="a14">
           <p:sp>
             <p:nvSpPr>
               <p:cNvPr id="840" name="TextBox 839">
@@ -18522,7 +18274,7 @@
             </p:txBody>
           </p:sp>
         </mc:Choice>
-        <mc:Fallback>
+        <mc:Fallback xmlns="">
           <p:sp>
             <p:nvSpPr>
               <p:cNvPr id="840" name="TextBox 839">
@@ -18775,8 +18527,8 @@
           </p:txBody>
         </p:sp>
       </p:grpSp>
-      <mc:AlternateContent xmlns:mc="http://schemas.openxmlformats.org/markup-compatibility/2006">
-        <mc:Choice xmlns:a14="http://schemas.microsoft.com/office/drawing/2010/main" Requires="a14">
+      <mc:AlternateContent xmlns:mc="http://schemas.openxmlformats.org/markup-compatibility/2006" xmlns:a14="http://schemas.microsoft.com/office/drawing/2010/main">
+        <mc:Choice Requires="a14">
           <p:sp>
             <p:nvSpPr>
               <p:cNvPr id="846" name="TextBox 845">
@@ -18866,7 +18618,7 @@
             </p:txBody>
           </p:sp>
         </mc:Choice>
-        <mc:Fallback>
+        <mc:Fallback xmlns="">
           <p:sp>
             <p:nvSpPr>
               <p:cNvPr id="846" name="TextBox 845">
@@ -19119,8 +18871,8 @@
           </p:txBody>
         </p:sp>
       </p:grpSp>
-      <mc:AlternateContent xmlns:mc="http://schemas.openxmlformats.org/markup-compatibility/2006">
-        <mc:Choice xmlns:a14="http://schemas.microsoft.com/office/drawing/2010/main" Requires="a14">
+      <mc:AlternateContent xmlns:mc="http://schemas.openxmlformats.org/markup-compatibility/2006" xmlns:a14="http://schemas.microsoft.com/office/drawing/2010/main">
+        <mc:Choice Requires="a14">
           <p:sp>
             <p:nvSpPr>
               <p:cNvPr id="852" name="TextBox 851">
@@ -19210,7 +18962,7 @@
             </p:txBody>
           </p:sp>
         </mc:Choice>
-        <mc:Fallback>
+        <mc:Fallback xmlns="">
           <p:sp>
             <p:nvSpPr>
               <p:cNvPr id="852" name="TextBox 851">
@@ -19463,8 +19215,8 @@
           </p:txBody>
         </p:sp>
       </p:grpSp>
-      <mc:AlternateContent xmlns:mc="http://schemas.openxmlformats.org/markup-compatibility/2006">
-        <mc:Choice xmlns:a14="http://schemas.microsoft.com/office/drawing/2010/main" Requires="a14">
+      <mc:AlternateContent xmlns:mc="http://schemas.openxmlformats.org/markup-compatibility/2006" xmlns:a14="http://schemas.microsoft.com/office/drawing/2010/main">
+        <mc:Choice Requires="a14">
           <p:sp>
             <p:nvSpPr>
               <p:cNvPr id="858" name="TextBox 857">
@@ -19554,7 +19306,7 @@
             </p:txBody>
           </p:sp>
         </mc:Choice>
-        <mc:Fallback>
+        <mc:Fallback xmlns="">
           <p:sp>
             <p:nvSpPr>
               <p:cNvPr id="858" name="TextBox 857">
@@ -22652,8 +22404,8 @@
           </p:txBody>
         </p:sp>
       </p:grpSp>
-      <mc:AlternateContent xmlns:mc="http://schemas.openxmlformats.org/markup-compatibility/2006">
-        <mc:Choice xmlns:a14="http://schemas.microsoft.com/office/drawing/2010/main" Requires="a14">
+      <mc:AlternateContent xmlns:mc="http://schemas.openxmlformats.org/markup-compatibility/2006" xmlns:a14="http://schemas.microsoft.com/office/drawing/2010/main">
+        <mc:Choice Requires="a14">
           <p:sp>
             <p:nvSpPr>
               <p:cNvPr id="916" name="TextBox 915">
@@ -22723,7 +22475,7 @@
             </p:txBody>
           </p:sp>
         </mc:Choice>
-        <mc:Fallback>
+        <mc:Fallback xmlns="">
           <p:sp>
             <p:nvSpPr>
               <p:cNvPr id="916" name="TextBox 915">
@@ -22976,8 +22728,8 @@
           </p:txBody>
         </p:sp>
       </p:grpSp>
-      <mc:AlternateContent xmlns:mc="http://schemas.openxmlformats.org/markup-compatibility/2006">
-        <mc:Choice xmlns:a14="http://schemas.microsoft.com/office/drawing/2010/main" Requires="a14">
+      <mc:AlternateContent xmlns:mc="http://schemas.openxmlformats.org/markup-compatibility/2006" xmlns:a14="http://schemas.microsoft.com/office/drawing/2010/main">
+        <mc:Choice Requires="a14">
           <p:sp>
             <p:nvSpPr>
               <p:cNvPr id="922" name="TextBox 921">
@@ -23067,7 +22819,7 @@
             </p:txBody>
           </p:sp>
         </mc:Choice>
-        <mc:Fallback>
+        <mc:Fallback xmlns="">
           <p:sp>
             <p:nvSpPr>
               <p:cNvPr id="922" name="TextBox 921">
@@ -23320,8 +23072,8 @@
           </p:txBody>
         </p:sp>
       </p:grpSp>
-      <mc:AlternateContent xmlns:mc="http://schemas.openxmlformats.org/markup-compatibility/2006">
-        <mc:Choice xmlns:a14="http://schemas.microsoft.com/office/drawing/2010/main" Requires="a14">
+      <mc:AlternateContent xmlns:mc="http://schemas.openxmlformats.org/markup-compatibility/2006" xmlns:a14="http://schemas.microsoft.com/office/drawing/2010/main">
+        <mc:Choice Requires="a14">
           <p:sp>
             <p:nvSpPr>
               <p:cNvPr id="928" name="TextBox 927">
@@ -23411,7 +23163,7 @@
             </p:txBody>
           </p:sp>
         </mc:Choice>
-        <mc:Fallback>
+        <mc:Fallback xmlns="">
           <p:sp>
             <p:nvSpPr>
               <p:cNvPr id="928" name="TextBox 927">
@@ -23664,8 +23416,8 @@
           </p:txBody>
         </p:sp>
       </p:grpSp>
-      <mc:AlternateContent xmlns:mc="http://schemas.openxmlformats.org/markup-compatibility/2006">
-        <mc:Choice xmlns:a14="http://schemas.microsoft.com/office/drawing/2010/main" Requires="a14">
+      <mc:AlternateContent xmlns:mc="http://schemas.openxmlformats.org/markup-compatibility/2006" xmlns:a14="http://schemas.microsoft.com/office/drawing/2010/main">
+        <mc:Choice Requires="a14">
           <p:sp>
             <p:nvSpPr>
               <p:cNvPr id="934" name="TextBox 933">
@@ -23755,7 +23507,7 @@
             </p:txBody>
           </p:sp>
         </mc:Choice>
-        <mc:Fallback>
+        <mc:Fallback xmlns="">
           <p:sp>
             <p:nvSpPr>
               <p:cNvPr id="934" name="TextBox 933">
@@ -24628,8 +24380,8 @@
           </p:txBody>
         </p:sp>
       </p:grpSp>
-      <mc:AlternateContent xmlns:mc="http://schemas.openxmlformats.org/markup-compatibility/2006">
-        <mc:Choice xmlns:a14="http://schemas.microsoft.com/office/drawing/2010/main" Requires="a14">
+      <mc:AlternateContent xmlns:mc="http://schemas.openxmlformats.org/markup-compatibility/2006" xmlns:a14="http://schemas.microsoft.com/office/drawing/2010/main">
+        <mc:Choice Requires="a14">
           <p:sp>
             <p:nvSpPr>
               <p:cNvPr id="952" name="TextBox 951">
@@ -24719,7 +24471,7 @@
             </p:txBody>
           </p:sp>
         </mc:Choice>
-        <mc:Fallback>
+        <mc:Fallback xmlns="">
           <p:sp>
             <p:nvSpPr>
               <p:cNvPr id="952" name="TextBox 951">
@@ -25700,8 +25452,8 @@
           </p:txBody>
         </p:sp>
       </p:grpSp>
-      <mc:AlternateContent xmlns:mc="http://schemas.openxmlformats.org/markup-compatibility/2006">
-        <mc:Choice xmlns:a14="http://schemas.microsoft.com/office/drawing/2010/main" Requires="a14">
+      <mc:AlternateContent xmlns:mc="http://schemas.openxmlformats.org/markup-compatibility/2006" xmlns:a14="http://schemas.microsoft.com/office/drawing/2010/main">
+        <mc:Choice Requires="a14">
           <p:sp>
             <p:nvSpPr>
               <p:cNvPr id="978" name="TextBox 977">
@@ -25797,7 +25549,7 @@
             </p:txBody>
           </p:sp>
         </mc:Choice>
-        <mc:Fallback>
+        <mc:Fallback xmlns="">
           <p:sp>
             <p:nvSpPr>
               <p:cNvPr id="978" name="TextBox 977">
@@ -26518,8 +26270,8 @@
           </p:txBody>
         </p:sp>
       </p:grpSp>
-      <mc:AlternateContent xmlns:mc="http://schemas.openxmlformats.org/markup-compatibility/2006">
-        <mc:Choice xmlns:a14="http://schemas.microsoft.com/office/drawing/2010/main" Requires="a14">
+      <mc:AlternateContent xmlns:mc="http://schemas.openxmlformats.org/markup-compatibility/2006" xmlns:a14="http://schemas.microsoft.com/office/drawing/2010/main">
+        <mc:Choice Requires="a14">
           <p:sp>
             <p:nvSpPr>
               <p:cNvPr id="1004" name="TextBox 1003">
@@ -26609,7 +26361,7 @@
             </p:txBody>
           </p:sp>
         </mc:Choice>
-        <mc:Fallback>
+        <mc:Fallback xmlns="">
           <p:sp>
             <p:nvSpPr>
               <p:cNvPr id="1004" name="TextBox 1003">
@@ -27762,8 +27514,8 @@
           </p:txBody>
         </p:sp>
       </p:grpSp>
-      <mc:AlternateContent xmlns:mc="http://schemas.openxmlformats.org/markup-compatibility/2006">
-        <mc:Choice xmlns:a14="http://schemas.microsoft.com/office/drawing/2010/main" Requires="a14">
+      <mc:AlternateContent xmlns:mc="http://schemas.openxmlformats.org/markup-compatibility/2006" xmlns:a14="http://schemas.microsoft.com/office/drawing/2010/main">
+        <mc:Choice Requires="a14">
           <p:sp>
             <p:nvSpPr>
               <p:cNvPr id="1032" name="TextBox 1031">
@@ -27832,7 +27584,7 @@
             </p:txBody>
           </p:sp>
         </mc:Choice>
-        <mc:Fallback>
+        <mc:Fallback xmlns="">
           <p:sp>
             <p:nvSpPr>
               <p:cNvPr id="1032" name="TextBox 1031">
@@ -31361,8 +31113,8 @@
           </p:txBody>
         </p:sp>
       </p:grpSp>
-      <mc:AlternateContent xmlns:mc="http://schemas.openxmlformats.org/markup-compatibility/2006">
-        <mc:Choice xmlns:a14="http://schemas.microsoft.com/office/drawing/2010/main" Requires="a14">
+      <mc:AlternateContent xmlns:mc="http://schemas.openxmlformats.org/markup-compatibility/2006" xmlns:a14="http://schemas.microsoft.com/office/drawing/2010/main">
+        <mc:Choice Requires="a14">
           <p:sp>
             <p:nvSpPr>
               <p:cNvPr id="1134" name="TextBox 1133">
@@ -31452,7 +31204,7 @@
             </p:txBody>
           </p:sp>
         </mc:Choice>
-        <mc:Fallback>
+        <mc:Fallback xmlns="">
           <p:sp>
             <p:nvSpPr>
               <p:cNvPr id="1134" name="TextBox 1133">
@@ -36747,8 +36499,8 @@
           </p:txBody>
         </p:sp>
       </p:grpSp>
-      <mc:AlternateContent xmlns:mc="http://schemas.openxmlformats.org/markup-compatibility/2006">
-        <mc:Choice xmlns:a14="http://schemas.microsoft.com/office/drawing/2010/main" Requires="a14">
+      <mc:AlternateContent xmlns:mc="http://schemas.openxmlformats.org/markup-compatibility/2006" xmlns:a14="http://schemas.microsoft.com/office/drawing/2010/main">
+        <mc:Choice Requires="a14">
           <p:sp>
             <p:nvSpPr>
               <p:cNvPr id="1241" name="TextBox 1240">
@@ -36817,7 +36569,7 @@
             </p:txBody>
           </p:sp>
         </mc:Choice>
-        <mc:Fallback>
+        <mc:Fallback xmlns="">
           <p:sp>
             <p:nvSpPr>
               <p:cNvPr id="1241" name="TextBox 1240">
@@ -37028,8 +36780,8 @@
           </p:txBody>
         </p:sp>
       </p:grpSp>
-      <mc:AlternateContent xmlns:mc="http://schemas.openxmlformats.org/markup-compatibility/2006">
-        <mc:Choice xmlns:a14="http://schemas.microsoft.com/office/drawing/2010/main" Requires="a14">
+      <mc:AlternateContent xmlns:mc="http://schemas.openxmlformats.org/markup-compatibility/2006" xmlns:a14="http://schemas.microsoft.com/office/drawing/2010/main">
+        <mc:Choice Requires="a14">
           <p:sp>
             <p:nvSpPr>
               <p:cNvPr id="1246" name="TextBox 1245">
@@ -37086,13 +36838,7 @@
                             <a:rPr lang="fr-CH" i="1">
                               <a:latin typeface="Cambria Math" panose="02040503050406030204" pitchFamily="18" charset="0"/>
                             </a:rPr>
-                            <m:t>−</m:t>
-                          </m:r>
-                          <m:r>
-                            <a:rPr lang="fr-CH" i="1">
-                              <a:latin typeface="Cambria Math" panose="02040503050406030204" pitchFamily="18" charset="0"/>
-                            </a:rPr>
-                            <m:t>2</m:t>
+                            <m:t>−2</m:t>
                           </m:r>
                         </m:sup>
                       </m:sSup>
@@ -37104,7 +36850,7 @@
             </p:txBody>
           </p:sp>
         </mc:Choice>
-        <mc:Fallback>
+        <mc:Fallback xmlns="">
           <p:sp>
             <p:nvSpPr>
               <p:cNvPr id="1246" name="TextBox 1245">
@@ -37315,8 +37061,8 @@
           </p:txBody>
         </p:sp>
       </p:grpSp>
-      <mc:AlternateContent xmlns:mc="http://schemas.openxmlformats.org/markup-compatibility/2006">
-        <mc:Choice xmlns:a14="http://schemas.microsoft.com/office/drawing/2010/main" Requires="a14">
+      <mc:AlternateContent xmlns:mc="http://schemas.openxmlformats.org/markup-compatibility/2006" xmlns:a14="http://schemas.microsoft.com/office/drawing/2010/main">
+        <mc:Choice Requires="a14">
           <p:sp>
             <p:nvSpPr>
               <p:cNvPr id="1251" name="TextBox 1250">
@@ -37373,13 +37119,7 @@
                             <a:rPr lang="fr-CH" i="1">
                               <a:latin typeface="Cambria Math" panose="02040503050406030204" pitchFamily="18" charset="0"/>
                             </a:rPr>
-                            <m:t>−</m:t>
-                          </m:r>
-                          <m:r>
-                            <a:rPr lang="fr-CH" i="1">
-                              <a:latin typeface="Cambria Math" panose="02040503050406030204" pitchFamily="18" charset="0"/>
-                            </a:rPr>
-                            <m:t>3</m:t>
+                            <m:t>−3</m:t>
                           </m:r>
                         </m:sup>
                       </m:sSup>
@@ -37391,7 +37131,7 @@
             </p:txBody>
           </p:sp>
         </mc:Choice>
-        <mc:Fallback>
+        <mc:Fallback xmlns="">
           <p:sp>
             <p:nvSpPr>
               <p:cNvPr id="1251" name="TextBox 1250">
@@ -37854,8 +37594,8 @@
           </p:txBody>
         </p:sp>
       </p:grpSp>
-      <mc:AlternateContent xmlns:mc="http://schemas.openxmlformats.org/markup-compatibility/2006">
-        <mc:Choice xmlns:a14="http://schemas.microsoft.com/office/drawing/2010/main" Requires="a14">
+      <mc:AlternateContent xmlns:mc="http://schemas.openxmlformats.org/markup-compatibility/2006" xmlns:a14="http://schemas.microsoft.com/office/drawing/2010/main">
+        <mc:Choice Requires="a14">
           <p:sp>
             <p:nvSpPr>
               <p:cNvPr id="1262" name="TextBox 1261">
@@ -37925,7 +37665,7 @@
             </p:txBody>
           </p:sp>
         </mc:Choice>
-        <mc:Fallback>
+        <mc:Fallback xmlns="">
           <p:sp>
             <p:nvSpPr>
               <p:cNvPr id="1262" name="TextBox 1261">
@@ -38178,8 +37918,8 @@
           </p:txBody>
         </p:sp>
       </p:grpSp>
-      <mc:AlternateContent xmlns:mc="http://schemas.openxmlformats.org/markup-compatibility/2006">
-        <mc:Choice xmlns:a14="http://schemas.microsoft.com/office/drawing/2010/main" Requires="a14">
+      <mc:AlternateContent xmlns:mc="http://schemas.openxmlformats.org/markup-compatibility/2006" xmlns:a14="http://schemas.microsoft.com/office/drawing/2010/main">
+        <mc:Choice Requires="a14">
           <p:sp>
             <p:nvSpPr>
               <p:cNvPr id="1268" name="TextBox 1267">
@@ -38269,7 +38009,7 @@
             </p:txBody>
           </p:sp>
         </mc:Choice>
-        <mc:Fallback>
+        <mc:Fallback xmlns="">
           <p:sp>
             <p:nvSpPr>
               <p:cNvPr id="1268" name="TextBox 1267">
@@ -38522,8 +38262,8 @@
           </p:txBody>
         </p:sp>
       </p:grpSp>
-      <mc:AlternateContent xmlns:mc="http://schemas.openxmlformats.org/markup-compatibility/2006">
-        <mc:Choice xmlns:a14="http://schemas.microsoft.com/office/drawing/2010/main" Requires="a14">
+      <mc:AlternateContent xmlns:mc="http://schemas.openxmlformats.org/markup-compatibility/2006" xmlns:a14="http://schemas.microsoft.com/office/drawing/2010/main">
+        <mc:Choice Requires="a14">
           <p:sp>
             <p:nvSpPr>
               <p:cNvPr id="1274" name="TextBox 1273">
@@ -38613,7 +38353,7 @@
             </p:txBody>
           </p:sp>
         </mc:Choice>
-        <mc:Fallback>
+        <mc:Fallback xmlns="">
           <p:sp>
             <p:nvSpPr>
               <p:cNvPr id="1274" name="TextBox 1273">
@@ -38866,8 +38606,8 @@
           </p:txBody>
         </p:sp>
       </p:grpSp>
-      <mc:AlternateContent xmlns:mc="http://schemas.openxmlformats.org/markup-compatibility/2006">
-        <mc:Choice xmlns:a14="http://schemas.microsoft.com/office/drawing/2010/main" Requires="a14">
+      <mc:AlternateContent xmlns:mc="http://schemas.openxmlformats.org/markup-compatibility/2006" xmlns:a14="http://schemas.microsoft.com/office/drawing/2010/main">
+        <mc:Choice Requires="a14">
           <p:sp>
             <p:nvSpPr>
               <p:cNvPr id="1280" name="TextBox 1279">
@@ -38957,7 +38697,7 @@
             </p:txBody>
           </p:sp>
         </mc:Choice>
-        <mc:Fallback>
+        <mc:Fallback xmlns="">
           <p:sp>
             <p:nvSpPr>
               <p:cNvPr id="1280" name="TextBox 1279">
@@ -42988,10 +42728,10 @@
       </p:sp>
       <p:sp>
         <p:nvSpPr>
-          <p:cNvPr id="1372" name="TextBox 1371">
-            <a:extLst>
-              <a:ext uri="{FF2B5EF4-FFF2-40B4-BE49-F238E27FC236}">
-                <a16:creationId xmlns:a16="http://schemas.microsoft.com/office/drawing/2014/main" id="{D932AD00-8201-84F0-EC1E-BA4119AE0856}"/>
+          <p:cNvPr id="4" name="TextBox 3">
+            <a:extLst>
+              <a:ext uri="{FF2B5EF4-FFF2-40B4-BE49-F238E27FC236}">
+                <a16:creationId xmlns:a16="http://schemas.microsoft.com/office/drawing/2014/main" id="{DED074F0-2431-6C8D-C755-1BF90C57031B}"/>
               </a:ext>
             </a:extLst>
           </p:cNvPr>
@@ -43000,8 +42740,8 @@
         </p:nvSpPr>
         <p:spPr>
           <a:xfrm>
-            <a:off x="2650446" y="9131527"/>
-            <a:ext cx="791146" cy="276999"/>
+            <a:off x="1331024" y="10534896"/>
+            <a:ext cx="878776" cy="276999"/>
           </a:xfrm>
           <a:prstGeom prst="rect">
             <a:avLst/>
@@ -43022,145 +42762,49 @@
           </a:p>
         </p:txBody>
       </p:sp>
-      <p:sp>
-        <p:nvSpPr>
-          <p:cNvPr id="1373" name="Rectangle 1372">
-            <a:extLst>
-              <a:ext uri="{FF2B5EF4-FFF2-40B4-BE49-F238E27FC236}">
-                <a16:creationId xmlns:a16="http://schemas.microsoft.com/office/drawing/2014/main" id="{D197AB9C-3F6C-865E-5BC5-5CE36A2EFA6F}"/>
-              </a:ext>
-            </a:extLst>
-          </p:cNvPr>
-          <p:cNvSpPr/>
-          <p:nvPr/>
-        </p:nvSpPr>
-        <p:spPr>
-          <a:xfrm>
-            <a:off x="3396011" y="8556998"/>
-            <a:ext cx="354076" cy="354076"/>
-          </a:xfrm>
-          <a:prstGeom prst="rect">
-            <a:avLst/>
-          </a:prstGeom>
-          <a:solidFill>
-            <a:srgbClr val="FFFF00"/>
-          </a:solidFill>
-        </p:spPr>
-        <p:style>
-          <a:lnRef idx="2">
-            <a:schemeClr val="accent1">
-              <a:shade val="15000"/>
-            </a:schemeClr>
-          </a:lnRef>
-          <a:fillRef idx="1">
-            <a:schemeClr val="accent1"/>
-          </a:fillRef>
-          <a:effectRef idx="0">
-            <a:schemeClr val="accent1"/>
-          </a:effectRef>
-          <a:fontRef idx="minor">
-            <a:schemeClr val="lt1"/>
-          </a:fontRef>
-        </p:style>
-        <p:txBody>
-          <a:bodyPr lIns="0" tIns="0" rIns="0" bIns="0" rtlCol="0" anchor="ctr"/>
-          <a:lstStyle/>
-          <a:p>
-            <a:pPr algn="ctr"/>
-            <a:r>
-              <a:rPr lang="fr-CH" dirty="0">
-                <a:solidFill>
-                  <a:schemeClr val="tx1"/>
-                </a:solidFill>
-              </a:rPr>
-              <a:t>0/1</a:t>
-            </a:r>
-            <a:endParaRPr lang="en-US" dirty="0">
-              <a:solidFill>
-                <a:schemeClr val="tx1"/>
-              </a:solidFill>
-            </a:endParaRPr>
-          </a:p>
-        </p:txBody>
-      </p:sp>
       <p:cxnSp>
         <p:nvCxnSpPr>
-          <p:cNvPr id="1374" name="Straight Arrow Connector 1373">
-            <a:extLst>
-              <a:ext uri="{FF2B5EF4-FFF2-40B4-BE49-F238E27FC236}">
-                <a16:creationId xmlns:a16="http://schemas.microsoft.com/office/drawing/2014/main" id="{AD2EEF41-282D-B9ED-CBD9-CF4654B0253C}"/>
+          <p:cNvPr id="6" name="Straight Connector 5">
+            <a:extLst>
+              <a:ext uri="{FF2B5EF4-FFF2-40B4-BE49-F238E27FC236}">
+                <a16:creationId xmlns:a16="http://schemas.microsoft.com/office/drawing/2014/main" id="{EF3E99CC-6062-9D73-3E72-AD32DD13F182}"/>
               </a:ext>
             </a:extLst>
           </p:cNvPr>
           <p:cNvCxnSpPr>
             <a:cxnSpLocks/>
-            <a:stCxn id="1373" idx="2"/>
           </p:cNvCxnSpPr>
           <p:nvPr/>
         </p:nvCxnSpPr>
         <p:spPr>
           <a:xfrm>
-            <a:off x="3573049" y="8911074"/>
-            <a:ext cx="0" cy="1482357"/>
-          </a:xfrm>
-          <a:prstGeom prst="straightConnector1">
+            <a:off x="590550" y="10439400"/>
+            <a:ext cx="19983450" cy="0"/>
+          </a:xfrm>
+          <a:prstGeom prst="line">
             <a:avLst/>
           </a:prstGeom>
           <a:ln>
-            <a:tailEnd type="triangle"/>
+            <a:solidFill>
+              <a:schemeClr val="tx1"/>
+            </a:solidFill>
           </a:ln>
         </p:spPr>
         <p:style>
           <a:lnRef idx="2">
-            <a:schemeClr val="dk1"/>
+            <a:schemeClr val="accent1"/>
           </a:lnRef>
           <a:fillRef idx="0">
-            <a:schemeClr val="dk1"/>
+            <a:schemeClr val="accent1"/>
           </a:fillRef>
           <a:effectRef idx="1">
-            <a:schemeClr val="dk1"/>
+            <a:schemeClr val="accent1"/>
           </a:effectRef>
           <a:fontRef idx="minor">
             <a:schemeClr val="tx1"/>
           </a:fontRef>
         </p:style>
       </p:cxnSp>
-      <p:sp>
-        <p:nvSpPr>
-          <p:cNvPr id="1377" name="TextBox 1376">
-            <a:extLst>
-              <a:ext uri="{FF2B5EF4-FFF2-40B4-BE49-F238E27FC236}">
-                <a16:creationId xmlns:a16="http://schemas.microsoft.com/office/drawing/2014/main" id="{539C63AE-43FE-004A-8D82-008036AB4EF3}"/>
-              </a:ext>
-            </a:extLst>
-          </p:cNvPr>
-          <p:cNvSpPr txBox="1"/>
-          <p:nvPr/>
-        </p:nvSpPr>
-        <p:spPr>
-          <a:xfrm>
-            <a:off x="3313386" y="8194267"/>
-            <a:ext cx="791146" cy="276999"/>
-          </a:xfrm>
-          <a:prstGeom prst="rect">
-            <a:avLst/>
-          </a:prstGeom>
-          <a:noFill/>
-        </p:spPr>
-        <p:txBody>
-          <a:bodyPr wrap="square" lIns="0" tIns="0" rIns="0" bIns="0" rtlCol="0">
-            <a:spAutoFit/>
-          </a:bodyPr>
-          <a:lstStyle/>
-          <a:p>
-            <a:r>
-              <a:rPr lang="fr-CH" dirty="0"/>
-              <a:t>BOOL</a:t>
-            </a:r>
-            <a:endParaRPr lang="en-US" dirty="0"/>
-          </a:p>
-        </p:txBody>
-      </p:sp>
     </p:spTree>
     <p:extLst>
       <p:ext uri="{BB962C8B-B14F-4D97-AF65-F5344CB8AC3E}">

</xml_diff>